<commit_message>
extensive round of updates
</commit_message>
<xml_diff>
--- a/image-workspace/website-graphics.pptx
+++ b/image-workspace/website-graphics.pptx
@@ -9,6 +9,7 @@
     <p:sldId id="257" r:id="rId3"/>
     <p:sldId id="258" r:id="rId4"/>
     <p:sldId id="259" r:id="rId5"/>
+    <p:sldId id="260" r:id="rId6"/>
   </p:sldIdLst>
   <p:sldSz cx="12192000" cy="6858000"/>
   <p:notesSz cx="6858000" cy="9144000"/>
@@ -257,7 +258,7 @@
           <a:p>
             <a:fld id="{552C84EF-83CD-774F-BA2A-96025F5012BD}" type="datetimeFigureOut">
               <a:rPr lang="en-US" smtClean="0"/>
-              <a:t>11/26/17</a:t>
+              <a:t>12/2/17</a:t>
             </a:fld>
             <a:endParaRPr lang="en-US"/>
           </a:p>
@@ -427,7 +428,7 @@
           <a:p>
             <a:fld id="{552C84EF-83CD-774F-BA2A-96025F5012BD}" type="datetimeFigureOut">
               <a:rPr lang="en-US" smtClean="0"/>
-              <a:t>11/26/17</a:t>
+              <a:t>12/2/17</a:t>
             </a:fld>
             <a:endParaRPr lang="en-US"/>
           </a:p>
@@ -607,7 +608,7 @@
           <a:p>
             <a:fld id="{552C84EF-83CD-774F-BA2A-96025F5012BD}" type="datetimeFigureOut">
               <a:rPr lang="en-US" smtClean="0"/>
-              <a:t>11/26/17</a:t>
+              <a:t>12/2/17</a:t>
             </a:fld>
             <a:endParaRPr lang="en-US"/>
           </a:p>
@@ -777,7 +778,7 @@
           <a:p>
             <a:fld id="{552C84EF-83CD-774F-BA2A-96025F5012BD}" type="datetimeFigureOut">
               <a:rPr lang="en-US" smtClean="0"/>
-              <a:t>11/26/17</a:t>
+              <a:t>12/2/17</a:t>
             </a:fld>
             <a:endParaRPr lang="en-US"/>
           </a:p>
@@ -1023,7 +1024,7 @@
           <a:p>
             <a:fld id="{552C84EF-83CD-774F-BA2A-96025F5012BD}" type="datetimeFigureOut">
               <a:rPr lang="en-US" smtClean="0"/>
-              <a:t>11/26/17</a:t>
+              <a:t>12/2/17</a:t>
             </a:fld>
             <a:endParaRPr lang="en-US"/>
           </a:p>
@@ -1255,7 +1256,7 @@
           <a:p>
             <a:fld id="{552C84EF-83CD-774F-BA2A-96025F5012BD}" type="datetimeFigureOut">
               <a:rPr lang="en-US" smtClean="0"/>
-              <a:t>11/26/17</a:t>
+              <a:t>12/2/17</a:t>
             </a:fld>
             <a:endParaRPr lang="en-US"/>
           </a:p>
@@ -1622,7 +1623,7 @@
           <a:p>
             <a:fld id="{552C84EF-83CD-774F-BA2A-96025F5012BD}" type="datetimeFigureOut">
               <a:rPr lang="en-US" smtClean="0"/>
-              <a:t>11/26/17</a:t>
+              <a:t>12/2/17</a:t>
             </a:fld>
             <a:endParaRPr lang="en-US"/>
           </a:p>
@@ -1740,7 +1741,7 @@
           <a:p>
             <a:fld id="{552C84EF-83CD-774F-BA2A-96025F5012BD}" type="datetimeFigureOut">
               <a:rPr lang="en-US" smtClean="0"/>
-              <a:t>11/26/17</a:t>
+              <a:t>12/2/17</a:t>
             </a:fld>
             <a:endParaRPr lang="en-US"/>
           </a:p>
@@ -1835,7 +1836,7 @@
           <a:p>
             <a:fld id="{552C84EF-83CD-774F-BA2A-96025F5012BD}" type="datetimeFigureOut">
               <a:rPr lang="en-US" smtClean="0"/>
-              <a:t>11/26/17</a:t>
+              <a:t>12/2/17</a:t>
             </a:fld>
             <a:endParaRPr lang="en-US"/>
           </a:p>
@@ -2112,7 +2113,7 @@
           <a:p>
             <a:fld id="{552C84EF-83CD-774F-BA2A-96025F5012BD}" type="datetimeFigureOut">
               <a:rPr lang="en-US" smtClean="0"/>
-              <a:t>11/26/17</a:t>
+              <a:t>12/2/17</a:t>
             </a:fld>
             <a:endParaRPr lang="en-US"/>
           </a:p>
@@ -2365,7 +2366,7 @@
           <a:p>
             <a:fld id="{552C84EF-83CD-774F-BA2A-96025F5012BD}" type="datetimeFigureOut">
               <a:rPr lang="en-US" smtClean="0"/>
-              <a:t>11/26/17</a:t>
+              <a:t>12/2/17</a:t>
             </a:fld>
             <a:endParaRPr lang="en-US"/>
           </a:p>
@@ -2578,7 +2579,7 @@
           <a:p>
             <a:fld id="{552C84EF-83CD-774F-BA2A-96025F5012BD}" type="datetimeFigureOut">
               <a:rPr lang="en-US" smtClean="0"/>
-              <a:t>11/26/17</a:t>
+              <a:t>12/2/17</a:t>
             </a:fld>
             <a:endParaRPr lang="en-US"/>
           </a:p>
@@ -3289,7 +3290,7 @@
           </p:cNvPicPr>
           <p:nvPr/>
         </p:nvPicPr>
-        <p:blipFill>
+        <p:blipFill rotWithShape="1">
           <a:blip r:embed="rId2">
             <a:extLst>
               <a:ext uri="{28A0092B-C50C-407E-A947-70E740481C1C}">
@@ -3297,108 +3298,286 @@
               </a:ext>
             </a:extLst>
           </a:blip>
-          <a:stretch>
-            <a:fillRect/>
-          </a:stretch>
+          <a:srcRect t="15173" r="421" b="6414"/>
+          <a:stretch/>
         </p:blipFill>
         <p:spPr>
           <a:xfrm>
-            <a:off x="651641" y="578507"/>
-            <a:ext cx="10058400" cy="2524591"/>
+            <a:off x="609600" y="509048"/>
+            <a:ext cx="10016067" cy="1979629"/>
           </a:xfrm>
           <a:prstGeom prst="rect">
             <a:avLst/>
           </a:prstGeom>
+          <a:effectLst>
+            <a:outerShdw blurRad="50800" dist="38100" dir="2700000" algn="tl" rotWithShape="0">
+              <a:prstClr val="black">
+                <a:alpha val="40000"/>
+              </a:prstClr>
+            </a:outerShdw>
+          </a:effectLst>
         </p:spPr>
       </p:pic>
-      <p:pic>
-        <p:nvPicPr>
-          <p:cNvPr id="5" name="Picture 4" descr="overview-01.png"/>
-          <p:cNvPicPr>
-            <a:picLocks noChangeAspect="1"/>
-          </p:cNvPicPr>
+      <p:grpSp>
+        <p:nvGrpSpPr>
+          <p:cNvPr id="12" name="Group 11"/>
+          <p:cNvGrpSpPr/>
           <p:nvPr/>
-        </p:nvPicPr>
-        <p:blipFill rotWithShape="1">
-          <a:blip r:embed="rId3">
-            <a:extLst>
-              <a:ext uri="{28A0092B-C50C-407E-A947-70E740481C1C}">
-                <a14:useLocalDpi xmlns:a14="http://schemas.microsoft.com/office/drawing/2010/main" val="0"/>
-              </a:ext>
-            </a:extLst>
-          </a:blip>
-          <a:srcRect l="4155" t="4936" r="51591" b="46917"/>
-          <a:stretch/>
-        </p:blipFill>
-        <p:spPr>
+        </p:nvGrpSpPr>
+        <p:grpSpPr>
           <a:xfrm>
-            <a:off x="695325" y="3221319"/>
-            <a:ext cx="2436496" cy="2278402"/>
+            <a:off x="695325" y="3197052"/>
+            <a:ext cx="10044234" cy="2311969"/>
+            <a:chOff x="695325" y="3197052"/>
+            <a:chExt cx="10044234" cy="2311969"/>
           </a:xfrm>
-          <a:prstGeom prst="rect">
-            <a:avLst/>
-          </a:prstGeom>
-        </p:spPr>
-      </p:pic>
-      <p:pic>
-        <p:nvPicPr>
-          <p:cNvPr id="6" name="Picture 5" descr="overview-01.png"/>
-          <p:cNvPicPr>
-            <a:picLocks noChangeAspect="1"/>
-          </p:cNvPicPr>
-          <p:nvPr/>
-        </p:nvPicPr>
-        <p:blipFill rotWithShape="1">
-          <a:blip r:embed="rId3">
-            <a:extLst>
-              <a:ext uri="{28A0092B-C50C-407E-A947-70E740481C1C}">
-                <a14:useLocalDpi xmlns:a14="http://schemas.microsoft.com/office/drawing/2010/main" val="0"/>
-              </a:ext>
-            </a:extLst>
-          </a:blip>
-          <a:srcRect l="52630" t="5134" r="4299" b="46523"/>
-          <a:stretch/>
-        </p:blipFill>
-        <p:spPr>
-          <a:xfrm>
-            <a:off x="8296601" y="3221319"/>
-            <a:ext cx="2371399" cy="2287702"/>
-          </a:xfrm>
-          <a:prstGeom prst="rect">
-            <a:avLst/>
-          </a:prstGeom>
-        </p:spPr>
-      </p:pic>
-      <p:pic>
-        <p:nvPicPr>
-          <p:cNvPr id="7" name="Picture 6" descr="Fig-3new-v6-02.png"/>
-          <p:cNvPicPr>
-            <a:picLocks noChangeAspect="1"/>
-          </p:cNvPicPr>
-          <p:nvPr/>
-        </p:nvPicPr>
-        <p:blipFill>
-          <a:blip r:embed="rId4">
-            <a:extLst>
-              <a:ext uri="{28A0092B-C50C-407E-A947-70E740481C1C}">
-                <a14:useLocalDpi xmlns:a14="http://schemas.microsoft.com/office/drawing/2010/main" val="0"/>
-              </a:ext>
-            </a:extLst>
-          </a:blip>
-          <a:stretch>
-            <a:fillRect/>
-          </a:stretch>
-        </p:blipFill>
-        <p:spPr>
-          <a:xfrm>
-            <a:off x="3833807" y="3125895"/>
-            <a:ext cx="3694067" cy="2478549"/>
-          </a:xfrm>
-          <a:prstGeom prst="rect">
-            <a:avLst/>
-          </a:prstGeom>
-        </p:spPr>
-      </p:pic>
+          <a:effectLst>
+            <a:outerShdw blurRad="50800" dist="38100" dir="2700000" algn="tl" rotWithShape="0">
+              <a:prstClr val="black">
+                <a:alpha val="40000"/>
+              </a:prstClr>
+            </a:outerShdw>
+          </a:effectLst>
+        </p:grpSpPr>
+        <p:pic>
+          <p:nvPicPr>
+            <p:cNvPr id="5" name="Picture 4" descr="overview-01.png"/>
+            <p:cNvPicPr>
+              <a:picLocks noChangeAspect="1"/>
+            </p:cNvPicPr>
+            <p:nvPr/>
+          </p:nvPicPr>
+          <p:blipFill rotWithShape="1">
+            <a:blip r:embed="rId3">
+              <a:extLst>
+                <a:ext uri="{28A0092B-C50C-407E-A947-70E740481C1C}">
+                  <a14:useLocalDpi xmlns:a14="http://schemas.microsoft.com/office/drawing/2010/main" val="0"/>
+                </a:ext>
+              </a:extLst>
+            </a:blip>
+            <a:srcRect l="4155" t="4936" r="51591" b="46917"/>
+            <a:stretch/>
+          </p:blipFill>
+          <p:spPr>
+            <a:xfrm>
+              <a:off x="695325" y="3221319"/>
+              <a:ext cx="2436496" cy="2278402"/>
+            </a:xfrm>
+            <a:prstGeom prst="rect">
+              <a:avLst/>
+            </a:prstGeom>
+          </p:spPr>
+        </p:pic>
+        <p:pic>
+          <p:nvPicPr>
+            <p:cNvPr id="6" name="Picture 5" descr="overview-01.png"/>
+            <p:cNvPicPr>
+              <a:picLocks noChangeAspect="1"/>
+            </p:cNvPicPr>
+            <p:nvPr/>
+          </p:nvPicPr>
+          <p:blipFill rotWithShape="1">
+            <a:blip r:embed="rId3">
+              <a:extLst>
+                <a:ext uri="{28A0092B-C50C-407E-A947-70E740481C1C}">
+                  <a14:useLocalDpi xmlns:a14="http://schemas.microsoft.com/office/drawing/2010/main" val="0"/>
+                </a:ext>
+              </a:extLst>
+            </a:blip>
+            <a:srcRect l="52630" t="5134" r="4299" b="46523"/>
+            <a:stretch/>
+          </p:blipFill>
+          <p:spPr>
+            <a:xfrm>
+              <a:off x="8368160" y="3221319"/>
+              <a:ext cx="2371399" cy="2287702"/>
+            </a:xfrm>
+            <a:prstGeom prst="rect">
+              <a:avLst/>
+            </a:prstGeom>
+          </p:spPr>
+        </p:pic>
+        <p:grpSp>
+          <p:nvGrpSpPr>
+            <p:cNvPr id="11" name="Group 10"/>
+            <p:cNvGrpSpPr/>
+            <p:nvPr/>
+          </p:nvGrpSpPr>
+          <p:grpSpPr>
+            <a:xfrm>
+              <a:off x="3245420" y="3221321"/>
+              <a:ext cx="3134825" cy="2278401"/>
+              <a:chOff x="3217402" y="3215340"/>
+              <a:chExt cx="3094359" cy="2248990"/>
+            </a:xfrm>
+          </p:grpSpPr>
+          <p:pic>
+            <p:nvPicPr>
+              <p:cNvPr id="3" name="Picture 2"/>
+              <p:cNvPicPr>
+                <a:picLocks noChangeAspect="1"/>
+              </p:cNvPicPr>
+              <p:nvPr/>
+            </p:nvPicPr>
+            <p:blipFill rotWithShape="1">
+              <a:blip r:embed="rId4">
+                <a:extLst>
+                  <a:ext uri="{28A0092B-C50C-407E-A947-70E740481C1C}">
+                    <a14:useLocalDpi xmlns:a14="http://schemas.microsoft.com/office/drawing/2010/main" val="0"/>
+                  </a:ext>
+                </a:extLst>
+              </a:blip>
+              <a:srcRect l="218" t="1033" r="1395" b="1928"/>
+              <a:stretch/>
+            </p:blipFill>
+            <p:spPr>
+              <a:xfrm>
+                <a:off x="3217402" y="3215340"/>
+                <a:ext cx="3094359" cy="2248990"/>
+              </a:xfrm>
+              <a:prstGeom prst="rect">
+                <a:avLst/>
+              </a:prstGeom>
+            </p:spPr>
+          </p:pic>
+          <p:sp>
+            <p:nvSpPr>
+              <p:cNvPr id="8" name="Rectangle 7"/>
+              <p:cNvSpPr/>
+              <p:nvPr/>
+            </p:nvSpPr>
+            <p:spPr>
+              <a:xfrm>
+                <a:off x="3257247" y="3283889"/>
+                <a:ext cx="225423" cy="159026"/>
+              </a:xfrm>
+              <a:prstGeom prst="rect">
+                <a:avLst/>
+              </a:prstGeom>
+              <a:solidFill>
+                <a:schemeClr val="tx1"/>
+              </a:solidFill>
+              <a:ln>
+                <a:noFill/>
+              </a:ln>
+            </p:spPr>
+            <p:style>
+              <a:lnRef idx="2">
+                <a:schemeClr val="accent1">
+                  <a:shade val="50000"/>
+                </a:schemeClr>
+              </a:lnRef>
+              <a:fillRef idx="1">
+                <a:schemeClr val="accent1"/>
+              </a:fillRef>
+              <a:effectRef idx="0">
+                <a:schemeClr val="accent1"/>
+              </a:effectRef>
+              <a:fontRef idx="minor">
+                <a:schemeClr val="lt1"/>
+              </a:fontRef>
+            </p:style>
+            <p:txBody>
+              <a:bodyPr rtlCol="0" anchor="ctr"/>
+              <a:lstStyle/>
+              <a:p>
+                <a:pPr algn="ctr"/>
+                <a:endParaRPr lang="en-US"/>
+              </a:p>
+            </p:txBody>
+          </p:sp>
+        </p:grpSp>
+        <p:grpSp>
+          <p:nvGrpSpPr>
+            <p:cNvPr id="10" name="Group 9"/>
+            <p:cNvGrpSpPr/>
+            <p:nvPr/>
+          </p:nvGrpSpPr>
+          <p:grpSpPr>
+            <a:xfrm>
+              <a:off x="6493844" y="3197052"/>
+              <a:ext cx="1744223" cy="2302669"/>
+              <a:chOff x="6434311" y="3182086"/>
+              <a:chExt cx="1744223" cy="2302669"/>
+            </a:xfrm>
+          </p:grpSpPr>
+          <p:pic>
+            <p:nvPicPr>
+              <p:cNvPr id="2" name="Picture 1"/>
+              <p:cNvPicPr>
+                <a:picLocks noChangeAspect="1"/>
+              </p:cNvPicPr>
+              <p:nvPr/>
+            </p:nvPicPr>
+            <p:blipFill rotWithShape="1">
+              <a:blip r:embed="rId5">
+                <a:extLst>
+                  <a:ext uri="{28A0092B-C50C-407E-A947-70E740481C1C}">
+                    <a14:useLocalDpi xmlns:a14="http://schemas.microsoft.com/office/drawing/2010/main" val="0"/>
+                  </a:ext>
+                </a:extLst>
+              </a:blip>
+              <a:srcRect r="937" b="646"/>
+              <a:stretch/>
+            </p:blipFill>
+            <p:spPr>
+              <a:xfrm>
+                <a:off x="6434311" y="3182086"/>
+                <a:ext cx="1744223" cy="2302669"/>
+              </a:xfrm>
+              <a:prstGeom prst="rect">
+                <a:avLst/>
+              </a:prstGeom>
+            </p:spPr>
+          </p:pic>
+          <p:sp>
+            <p:nvSpPr>
+              <p:cNvPr id="9" name="Rectangle 8"/>
+              <p:cNvSpPr/>
+              <p:nvPr/>
+            </p:nvSpPr>
+            <p:spPr>
+              <a:xfrm>
+                <a:off x="6472073" y="3267987"/>
+                <a:ext cx="225423" cy="159026"/>
+              </a:xfrm>
+              <a:prstGeom prst="rect">
+                <a:avLst/>
+              </a:prstGeom>
+              <a:solidFill>
+                <a:schemeClr val="tx1"/>
+              </a:solidFill>
+              <a:ln>
+                <a:noFill/>
+              </a:ln>
+            </p:spPr>
+            <p:style>
+              <a:lnRef idx="2">
+                <a:schemeClr val="accent1">
+                  <a:shade val="50000"/>
+                </a:schemeClr>
+              </a:lnRef>
+              <a:fillRef idx="1">
+                <a:schemeClr val="accent1"/>
+              </a:fillRef>
+              <a:effectRef idx="0">
+                <a:schemeClr val="accent1"/>
+              </a:effectRef>
+              <a:fontRef idx="minor">
+                <a:schemeClr val="lt1"/>
+              </a:fontRef>
+            </p:style>
+            <p:txBody>
+              <a:bodyPr rtlCol="0" anchor="ctr"/>
+              <a:lstStyle/>
+              <a:p>
+                <a:pPr algn="ctr"/>
+                <a:endParaRPr lang="en-US"/>
+              </a:p>
+            </p:txBody>
+          </p:sp>
+        </p:grpSp>
+      </p:grpSp>
     </p:spTree>
     <p:extLst>
       <p:ext uri="{BB962C8B-B14F-4D97-AF65-F5344CB8AC3E}">
@@ -3412,129 +3591,7 @@
   <p:timing>
     <p:tnLst>
       <p:par>
-        <p:cTn id="1" dur="indefinite" restart="never" nodeType="tmRoot">
-          <p:childTnLst>
-            <p:seq concurrent="1" nextAc="seek">
-              <p:cTn id="2" dur="indefinite" nodeType="mainSeq">
-                <p:childTnLst>
-                  <p:par>
-                    <p:cTn id="3" fill="hold">
-                      <p:stCondLst>
-                        <p:cond delay="indefinite"/>
-                      </p:stCondLst>
-                      <p:childTnLst>
-                        <p:par>
-                          <p:cTn id="4" fill="hold">
-                            <p:stCondLst>
-                              <p:cond delay="0"/>
-                            </p:stCondLst>
-                            <p:childTnLst>
-                              <p:par>
-                                <p:cTn id="5" presetID="53" presetClass="entr" presetSubtype="16" fill="hold" nodeType="clickEffect">
-                                  <p:stCondLst>
-                                    <p:cond delay="0"/>
-                                  </p:stCondLst>
-                                  <p:childTnLst>
-                                    <p:set>
-                                      <p:cBhvr>
-                                        <p:cTn id="6" dur="1" fill="hold">
-                                          <p:stCondLst>
-                                            <p:cond delay="0"/>
-                                          </p:stCondLst>
-                                        </p:cTn>
-                                        <p:tgtEl>
-                                          <p:spTgt spid="7"/>
-                                        </p:tgtEl>
-                                        <p:attrNameLst>
-                                          <p:attrName>style.visibility</p:attrName>
-                                        </p:attrNameLst>
-                                      </p:cBhvr>
-                                      <p:to>
-                                        <p:strVal val="visible"/>
-                                      </p:to>
-                                    </p:set>
-                                    <p:anim calcmode="lin" valueType="num">
-                                      <p:cBhvr>
-                                        <p:cTn id="7" dur="500" fill="hold"/>
-                                        <p:tgtEl>
-                                          <p:spTgt spid="7"/>
-                                        </p:tgtEl>
-                                        <p:attrNameLst>
-                                          <p:attrName>ppt_w</p:attrName>
-                                        </p:attrNameLst>
-                                      </p:cBhvr>
-                                      <p:tavLst>
-                                        <p:tav tm="0">
-                                          <p:val>
-                                            <p:fltVal val="0"/>
-                                          </p:val>
-                                        </p:tav>
-                                        <p:tav tm="100000">
-                                          <p:val>
-                                            <p:strVal val="#ppt_w"/>
-                                          </p:val>
-                                        </p:tav>
-                                      </p:tavLst>
-                                    </p:anim>
-                                    <p:anim calcmode="lin" valueType="num">
-                                      <p:cBhvr>
-                                        <p:cTn id="8" dur="500" fill="hold"/>
-                                        <p:tgtEl>
-                                          <p:spTgt spid="7"/>
-                                        </p:tgtEl>
-                                        <p:attrNameLst>
-                                          <p:attrName>ppt_h</p:attrName>
-                                        </p:attrNameLst>
-                                      </p:cBhvr>
-                                      <p:tavLst>
-                                        <p:tav tm="0">
-                                          <p:val>
-                                            <p:fltVal val="0"/>
-                                          </p:val>
-                                        </p:tav>
-                                        <p:tav tm="100000">
-                                          <p:val>
-                                            <p:strVal val="#ppt_h"/>
-                                          </p:val>
-                                        </p:tav>
-                                      </p:tavLst>
-                                    </p:anim>
-                                    <p:animEffect transition="in" filter="fade">
-                                      <p:cBhvr>
-                                        <p:cTn id="9" dur="500"/>
-                                        <p:tgtEl>
-                                          <p:spTgt spid="7"/>
-                                        </p:tgtEl>
-                                      </p:cBhvr>
-                                    </p:animEffect>
-                                  </p:childTnLst>
-                                </p:cTn>
-                              </p:par>
-                            </p:childTnLst>
-                          </p:cTn>
-                        </p:par>
-                      </p:childTnLst>
-                    </p:cTn>
-                  </p:par>
-                </p:childTnLst>
-              </p:cTn>
-              <p:prevCondLst>
-                <p:cond evt="onPrev" delay="0">
-                  <p:tgtEl>
-                    <p:sldTgt/>
-                  </p:tgtEl>
-                </p:cond>
-              </p:prevCondLst>
-              <p:nextCondLst>
-                <p:cond evt="onNext" delay="0">
-                  <p:tgtEl>
-                    <p:sldTgt/>
-                  </p:tgtEl>
-                </p:cond>
-              </p:nextCondLst>
-            </p:seq>
-          </p:childTnLst>
-        </p:cTn>
+        <p:cTn id="1" dur="indefinite" restart="never" nodeType="tmRoot"/>
       </p:par>
     </p:tnLst>
   </p:timing>
@@ -3592,6 +3649,202 @@
     <p:extLst>
       <p:ext uri="{BB962C8B-B14F-4D97-AF65-F5344CB8AC3E}">
         <p14:creationId xmlns:p14="http://schemas.microsoft.com/office/powerpoint/2010/main" val="6764527"/>
+      </p:ext>
+    </p:extLst>
+  </p:cSld>
+  <p:clrMapOvr>
+    <a:masterClrMapping/>
+  </p:clrMapOvr>
+</p:sld>
+</file>
+
+<file path=ppt/slides/slide5.xml><?xml version="1.0" encoding="utf-8"?>
+<p:sld xmlns:a="http://schemas.openxmlformats.org/drawingml/2006/main" xmlns:r="http://schemas.openxmlformats.org/officeDocument/2006/relationships" xmlns:p="http://schemas.openxmlformats.org/presentationml/2006/main">
+  <p:cSld>
+    <p:spTree>
+      <p:nvGrpSpPr>
+        <p:cNvPr id="1" name=""/>
+        <p:cNvGrpSpPr/>
+        <p:nvPr/>
+      </p:nvGrpSpPr>
+      <p:grpSpPr>
+        <a:xfrm>
+          <a:off x="0" y="0"/>
+          <a:ext cx="0" cy="0"/>
+          <a:chOff x="0" y="0"/>
+          <a:chExt cx="0" cy="0"/>
+        </a:xfrm>
+      </p:grpSpPr>
+      <p:pic>
+        <p:nvPicPr>
+          <p:cNvPr id="2" name="Picture 1"/>
+          <p:cNvPicPr>
+            <a:picLocks noChangeAspect="1"/>
+          </p:cNvPicPr>
+          <p:nvPr/>
+        </p:nvPicPr>
+        <p:blipFill>
+          <a:blip r:embed="rId2">
+            <a:extLst>
+              <a:ext uri="{28A0092B-C50C-407E-A947-70E740481C1C}">
+                <a14:useLocalDpi xmlns:a14="http://schemas.microsoft.com/office/drawing/2010/main" val="0"/>
+              </a:ext>
+            </a:extLst>
+          </a:blip>
+          <a:stretch>
+            <a:fillRect/>
+          </a:stretch>
+        </p:blipFill>
+        <p:spPr>
+          <a:xfrm>
+            <a:off x="5515412" y="2505088"/>
+            <a:ext cx="1920240" cy="950976"/>
+          </a:xfrm>
+          <a:prstGeom prst="rect">
+            <a:avLst/>
+          </a:prstGeom>
+        </p:spPr>
+      </p:pic>
+      <p:sp>
+        <p:nvSpPr>
+          <p:cNvPr id="3" name="Rounded Rectangle 2"/>
+          <p:cNvSpPr/>
+          <p:nvPr/>
+        </p:nvSpPr>
+        <p:spPr>
+          <a:xfrm>
+            <a:off x="5558523" y="2591574"/>
+            <a:ext cx="872034" cy="151812"/>
+          </a:xfrm>
+          <a:prstGeom prst="roundRect">
+            <a:avLst/>
+          </a:prstGeom>
+          <a:solidFill>
+            <a:srgbClr val="FF7800">
+              <a:alpha val="50196"/>
+            </a:srgbClr>
+          </a:solidFill>
+          <a:ln>
+            <a:noFill/>
+          </a:ln>
+        </p:spPr>
+        <p:style>
+          <a:lnRef idx="2">
+            <a:schemeClr val="accent1">
+              <a:shade val="50000"/>
+            </a:schemeClr>
+          </a:lnRef>
+          <a:fillRef idx="1">
+            <a:schemeClr val="accent1"/>
+          </a:fillRef>
+          <a:effectRef idx="0">
+            <a:schemeClr val="accent1"/>
+          </a:effectRef>
+          <a:fontRef idx="minor">
+            <a:schemeClr val="lt1"/>
+          </a:fontRef>
+        </p:style>
+        <p:txBody>
+          <a:bodyPr rtlCol="0" anchor="ctr"/>
+          <a:lstStyle/>
+          <a:p>
+            <a:pPr algn="ctr"/>
+            <a:endParaRPr lang="en-US"/>
+          </a:p>
+        </p:txBody>
+      </p:sp>
+      <p:sp>
+        <p:nvSpPr>
+          <p:cNvPr id="5" name="TextBox 4"/>
+          <p:cNvSpPr txBox="1"/>
+          <p:nvPr/>
+        </p:nvSpPr>
+        <p:spPr>
+          <a:xfrm>
+            <a:off x="5475809" y="2545002"/>
+            <a:ext cx="1037463" cy="230832"/>
+          </a:xfrm>
+          <a:prstGeom prst="rect">
+            <a:avLst/>
+          </a:prstGeom>
+          <a:noFill/>
+        </p:spPr>
+        <p:txBody>
+          <a:bodyPr wrap="none" rtlCol="0">
+            <a:spAutoFit/>
+          </a:bodyPr>
+          <a:lstStyle/>
+          <a:p>
+            <a:r>
+              <a:rPr lang="en-US" sz="900" dirty="0" smtClean="0">
+                <a:solidFill>
+                  <a:schemeClr val="bg1"/>
+                </a:solidFill>
+                <a:latin typeface="Helvetica" charset="0"/>
+                <a:ea typeface="Helvetica" charset="0"/>
+                <a:cs typeface="Helvetica" charset="0"/>
+              </a:rPr>
+              <a:t>Recorded Image</a:t>
+            </a:r>
+            <a:endParaRPr lang="en-US" sz="900" dirty="0">
+              <a:solidFill>
+                <a:schemeClr val="bg1"/>
+              </a:solidFill>
+              <a:latin typeface="Helvetica" charset="0"/>
+              <a:ea typeface="Helvetica" charset="0"/>
+              <a:cs typeface="Helvetica" charset="0"/>
+            </a:endParaRPr>
+          </a:p>
+        </p:txBody>
+      </p:sp>
+      <p:sp>
+        <p:nvSpPr>
+          <p:cNvPr id="6" name="TextBox 5"/>
+          <p:cNvSpPr txBox="1"/>
+          <p:nvPr/>
+        </p:nvSpPr>
+        <p:spPr>
+          <a:xfrm>
+            <a:off x="6475532" y="2545002"/>
+            <a:ext cx="954107" cy="230832"/>
+          </a:xfrm>
+          <a:prstGeom prst="rect">
+            <a:avLst/>
+          </a:prstGeom>
+          <a:noFill/>
+        </p:spPr>
+        <p:txBody>
+          <a:bodyPr wrap="none" rtlCol="0">
+            <a:spAutoFit/>
+          </a:bodyPr>
+          <a:lstStyle/>
+          <a:p>
+            <a:r>
+              <a:rPr lang="en-US" sz="900" dirty="0" smtClean="0">
+                <a:solidFill>
+                  <a:schemeClr val="bg1"/>
+                </a:solidFill>
+                <a:latin typeface="Helvetica" charset="0"/>
+                <a:ea typeface="Helvetica" charset="0"/>
+                <a:cs typeface="Helvetica" charset="0"/>
+              </a:rPr>
+              <a:t>Reconstruction</a:t>
+            </a:r>
+            <a:endParaRPr lang="en-US" sz="900" dirty="0">
+              <a:solidFill>
+                <a:schemeClr val="bg1"/>
+              </a:solidFill>
+              <a:latin typeface="Helvetica" charset="0"/>
+              <a:ea typeface="Helvetica" charset="0"/>
+              <a:cs typeface="Helvetica" charset="0"/>
+            </a:endParaRPr>
+          </a:p>
+        </p:txBody>
+      </p:sp>
+    </p:spTree>
+    <p:extLst>
+      <p:ext uri="{BB962C8B-B14F-4D97-AF65-F5344CB8AC3E}">
+        <p14:creationId xmlns:p14="http://schemas.microsoft.com/office/powerpoint/2010/main" val="1102039381"/>
       </p:ext>
     </p:extLst>
   </p:cSld>

</xml_diff>